<commit_message>
Fixed: actually added timeSeries.py to commit. Fixed: changed title inside infoFlow
</commit_message>
<xml_diff>
--- a/Docs/infoFlow/infoFlow.pptx
+++ b/Docs/infoFlow/infoFlow.pptx
@@ -104,6 +104,11 @@
       </a:defRPr>
     </a:lvl9pPr>
   </p:defaultTextStyle>
+  <p:extLst>
+    <p:ext uri="{EFAFB233-063F-42B5-8137-9DF3F51BA10A}">
+      <p15:sldGuideLst xmlns:p15="http://schemas.microsoft.com/office/powerpoint/2012/main"/>
+    </p:ext>
+  </p:extLst>
 </p:presentation>
 </file>
 
@@ -3787,7 +3792,7 @@
         <p:spPr>
           <a:xfrm>
             <a:off x="259080" y="376922"/>
-            <a:ext cx="3675045" cy="461665"/>
+            <a:ext cx="4601068" cy="461665"/>
           </a:xfrm>
           <a:prstGeom prst="rect">
             <a:avLst/>
@@ -3801,8 +3806,16 @@
           <a:lstStyle/>
           <a:p>
             <a:r>
-              <a:rPr lang="en-US" sz="2400" dirty="0"/>
-              <a:t>Intended Information Flow:</a:t>
+              <a:rPr lang="en-US" sz="2400" dirty="0" err="1">
+                <a:cs typeface="Arial" panose="020B0604020202020204" pitchFamily="34" charset="0"/>
+              </a:rPr>
+              <a:t>TSTools</a:t>
+            </a:r>
+            <a:r>
+              <a:rPr lang="en-US" sz="2400" dirty="0">
+                <a:cs typeface="Arial" panose="020B0604020202020204" pitchFamily="34" charset="0"/>
+              </a:rPr>
+              <a:t> Intended Information Flow:</a:t>
             </a:r>
           </a:p>
         </p:txBody>

</xml_diff>